<commit_message>
Updated syllabus, course schedule
</commit_message>
<xml_diff>
--- a/Lectures/Class1_Introductions.pptx
+++ b/Lectures/Class1_Introductions.pptx
@@ -297,7 +297,7 @@
           <a:p>
             <a:fld id="{85FAFF62-CFE8-3749-A213-F8E507DE4B15}" type="datetimeFigureOut">
               <a:rPr lang="en-US" smtClean="0"/>
-              <a:t>1/13/15</a:t>
+              <a:t>8/22/16</a:t>
             </a:fld>
             <a:endParaRPr lang="en-US"/>
           </a:p>
@@ -467,7 +467,7 @@
           <a:p>
             <a:fld id="{85FAFF62-CFE8-3749-A213-F8E507DE4B15}" type="datetimeFigureOut">
               <a:rPr lang="en-US" smtClean="0"/>
-              <a:t>1/13/15</a:t>
+              <a:t>8/22/16</a:t>
             </a:fld>
             <a:endParaRPr lang="en-US"/>
           </a:p>
@@ -647,7 +647,7 @@
           <a:p>
             <a:fld id="{85FAFF62-CFE8-3749-A213-F8E507DE4B15}" type="datetimeFigureOut">
               <a:rPr lang="en-US" smtClean="0"/>
-              <a:t>1/13/15</a:t>
+              <a:t>8/22/16</a:t>
             </a:fld>
             <a:endParaRPr lang="en-US"/>
           </a:p>
@@ -817,7 +817,7 @@
           <a:p>
             <a:fld id="{85FAFF62-CFE8-3749-A213-F8E507DE4B15}" type="datetimeFigureOut">
               <a:rPr lang="en-US" smtClean="0"/>
-              <a:t>1/13/15</a:t>
+              <a:t>8/22/16</a:t>
             </a:fld>
             <a:endParaRPr lang="en-US"/>
           </a:p>
@@ -1063,7 +1063,7 @@
           <a:p>
             <a:fld id="{85FAFF62-CFE8-3749-A213-F8E507DE4B15}" type="datetimeFigureOut">
               <a:rPr lang="en-US" smtClean="0"/>
-              <a:t>1/13/15</a:t>
+              <a:t>8/22/16</a:t>
             </a:fld>
             <a:endParaRPr lang="en-US"/>
           </a:p>
@@ -1351,7 +1351,7 @@
           <a:p>
             <a:fld id="{85FAFF62-CFE8-3749-A213-F8E507DE4B15}" type="datetimeFigureOut">
               <a:rPr lang="en-US" smtClean="0"/>
-              <a:t>1/13/15</a:t>
+              <a:t>8/22/16</a:t>
             </a:fld>
             <a:endParaRPr lang="en-US"/>
           </a:p>
@@ -1773,7 +1773,7 @@
           <a:p>
             <a:fld id="{85FAFF62-CFE8-3749-A213-F8E507DE4B15}" type="datetimeFigureOut">
               <a:rPr lang="en-US" smtClean="0"/>
-              <a:t>1/13/15</a:t>
+              <a:t>8/22/16</a:t>
             </a:fld>
             <a:endParaRPr lang="en-US"/>
           </a:p>
@@ -1891,7 +1891,7 @@
           <a:p>
             <a:fld id="{85FAFF62-CFE8-3749-A213-F8E507DE4B15}" type="datetimeFigureOut">
               <a:rPr lang="en-US" smtClean="0"/>
-              <a:t>1/13/15</a:t>
+              <a:t>8/22/16</a:t>
             </a:fld>
             <a:endParaRPr lang="en-US"/>
           </a:p>
@@ -1986,7 +1986,7 @@
           <a:p>
             <a:fld id="{85FAFF62-CFE8-3749-A213-F8E507DE4B15}" type="datetimeFigureOut">
               <a:rPr lang="en-US" smtClean="0"/>
-              <a:t>1/13/15</a:t>
+              <a:t>8/22/16</a:t>
             </a:fld>
             <a:endParaRPr lang="en-US"/>
           </a:p>
@@ -2263,7 +2263,7 @@
           <a:p>
             <a:fld id="{85FAFF62-CFE8-3749-A213-F8E507DE4B15}" type="datetimeFigureOut">
               <a:rPr lang="en-US" smtClean="0"/>
-              <a:t>1/13/15</a:t>
+              <a:t>8/22/16</a:t>
             </a:fld>
             <a:endParaRPr lang="en-US"/>
           </a:p>
@@ -2516,7 +2516,7 @@
           <a:p>
             <a:fld id="{85FAFF62-CFE8-3749-A213-F8E507DE4B15}" type="datetimeFigureOut">
               <a:rPr lang="en-US" smtClean="0"/>
-              <a:t>1/13/15</a:t>
+              <a:t>8/22/16</a:t>
             </a:fld>
             <a:endParaRPr lang="en-US"/>
           </a:p>
@@ -2729,7 +2729,7 @@
           <a:p>
             <a:fld id="{85FAFF62-CFE8-3749-A213-F8E507DE4B15}" type="datetimeFigureOut">
               <a:rPr lang="en-US" smtClean="0"/>
-              <a:t>1/13/15</a:t>
+              <a:t>8/22/16</a:t>
             </a:fld>
             <a:endParaRPr lang="en-US"/>
           </a:p>
@@ -3150,13 +3150,22 @@
           <a:p>
             <a:r>
               <a:rPr lang="en-US" dirty="0" smtClean="0"/>
-              <a:t>T | TH 3:30-4:45</a:t>
-            </a:r>
-          </a:p>
-          <a:p>
+              <a:t>T | TH </a:t>
+            </a:r>
             <a:r>
               <a:rPr lang="en-US" dirty="0" smtClean="0"/>
-              <a:t>ANDN 114</a:t>
+              <a:t>2 – 3:15</a:t>
+            </a:r>
+            <a:endParaRPr lang="en-US" dirty="0" smtClean="0"/>
+          </a:p>
+          <a:p>
+            <a:r>
+              <a:rPr lang="en-US" dirty="0" smtClean="0"/>
+              <a:t>ANDN </a:t>
+            </a:r>
+            <a:r>
+              <a:rPr lang="en-US" dirty="0" smtClean="0"/>
+              <a:t>309</a:t>
             </a:r>
             <a:endParaRPr lang="en-US" dirty="0"/>
           </a:p>
@@ -3572,13 +3581,11 @@
           <a:p>
             <a:r>
               <a:rPr lang="en-US" dirty="0" smtClean="0"/>
-              <a:t>Some of this class will be conducted via Google Hangouts online (for several reasons).</a:t>
-            </a:r>
-          </a:p>
-          <a:p>
+              <a:t>Effort</a:t>
+            </a:r>
             <a:r>
               <a:rPr lang="en-US" dirty="0" smtClean="0"/>
-              <a:t>Effort, ambition and creativity will get you an A in this class. Mailing it in will not go well for you.</a:t>
+              <a:t>, ambition and creativity will get you an A in this class. Mailing it in will not go well for you.</a:t>
             </a:r>
             <a:endParaRPr lang="en-US" dirty="0"/>
           </a:p>
@@ -3660,13 +3667,8 @@
           <a:p>
             <a:r>
               <a:rPr lang="en-US" dirty="0" smtClean="0"/>
-              <a:t>And, you’re not alone. Stuck? Struggling? Come to Maker Hours. Most Fridays, room 27 in Andersen Hall, </a:t>
-            </a:r>
-            <a:r>
-              <a:rPr lang="en-US" dirty="0" smtClean="0"/>
-              <a:t>1 to 5.</a:t>
-            </a:r>
-            <a:endParaRPr lang="en-US" dirty="0" smtClean="0"/>
+              <a:t>And, you’re not alone. Stuck? Struggling? Come to Maker Hours. Most Fridays, room 27 in Andersen Hall, 1 to 5.</a:t>
+            </a:r>
           </a:p>
           <a:p>
             <a:r>
@@ -3964,11 +3966,7 @@
           <a:p>
             <a:r>
               <a:rPr lang="en-US" dirty="0" smtClean="0"/>
-              <a:t>Clone </a:t>
-            </a:r>
-            <a:r>
-              <a:rPr lang="en-US" dirty="0" smtClean="0"/>
-              <a:t>the repository to your local machine.</a:t>
+              <a:t>Clone the repository to your local machine.</a:t>
             </a:r>
           </a:p>
           <a:p>

</xml_diff>

<commit_message>
updated schedule and first day lecture
</commit_message>
<xml_diff>
--- a/Lectures/Class1_Introductions.pptx
+++ b/Lectures/Class1_Introductions.pptx
@@ -297,7 +297,7 @@
           <a:p>
             <a:fld id="{85FAFF62-CFE8-3749-A213-F8E507DE4B15}" type="datetimeFigureOut">
               <a:rPr lang="en-US" smtClean="0"/>
-              <a:t>8/22/16</a:t>
+              <a:t>8/23/16</a:t>
             </a:fld>
             <a:endParaRPr lang="en-US"/>
           </a:p>
@@ -467,7 +467,7 @@
           <a:p>
             <a:fld id="{85FAFF62-CFE8-3749-A213-F8E507DE4B15}" type="datetimeFigureOut">
               <a:rPr lang="en-US" smtClean="0"/>
-              <a:t>8/22/16</a:t>
+              <a:t>8/23/16</a:t>
             </a:fld>
             <a:endParaRPr lang="en-US"/>
           </a:p>
@@ -647,7 +647,7 @@
           <a:p>
             <a:fld id="{85FAFF62-CFE8-3749-A213-F8E507DE4B15}" type="datetimeFigureOut">
               <a:rPr lang="en-US" smtClean="0"/>
-              <a:t>8/22/16</a:t>
+              <a:t>8/23/16</a:t>
             </a:fld>
             <a:endParaRPr lang="en-US"/>
           </a:p>
@@ -817,7 +817,7 @@
           <a:p>
             <a:fld id="{85FAFF62-CFE8-3749-A213-F8E507DE4B15}" type="datetimeFigureOut">
               <a:rPr lang="en-US" smtClean="0"/>
-              <a:t>8/22/16</a:t>
+              <a:t>8/23/16</a:t>
             </a:fld>
             <a:endParaRPr lang="en-US"/>
           </a:p>
@@ -1063,7 +1063,7 @@
           <a:p>
             <a:fld id="{85FAFF62-CFE8-3749-A213-F8E507DE4B15}" type="datetimeFigureOut">
               <a:rPr lang="en-US" smtClean="0"/>
-              <a:t>8/22/16</a:t>
+              <a:t>8/23/16</a:t>
             </a:fld>
             <a:endParaRPr lang="en-US"/>
           </a:p>
@@ -1351,7 +1351,7 @@
           <a:p>
             <a:fld id="{85FAFF62-CFE8-3749-A213-F8E507DE4B15}" type="datetimeFigureOut">
               <a:rPr lang="en-US" smtClean="0"/>
-              <a:t>8/22/16</a:t>
+              <a:t>8/23/16</a:t>
             </a:fld>
             <a:endParaRPr lang="en-US"/>
           </a:p>
@@ -1773,7 +1773,7 @@
           <a:p>
             <a:fld id="{85FAFF62-CFE8-3749-A213-F8E507DE4B15}" type="datetimeFigureOut">
               <a:rPr lang="en-US" smtClean="0"/>
-              <a:t>8/22/16</a:t>
+              <a:t>8/23/16</a:t>
             </a:fld>
             <a:endParaRPr lang="en-US"/>
           </a:p>
@@ -1891,7 +1891,7 @@
           <a:p>
             <a:fld id="{85FAFF62-CFE8-3749-A213-F8E507DE4B15}" type="datetimeFigureOut">
               <a:rPr lang="en-US" smtClean="0"/>
-              <a:t>8/22/16</a:t>
+              <a:t>8/23/16</a:t>
             </a:fld>
             <a:endParaRPr lang="en-US"/>
           </a:p>
@@ -1986,7 +1986,7 @@
           <a:p>
             <a:fld id="{85FAFF62-CFE8-3749-A213-F8E507DE4B15}" type="datetimeFigureOut">
               <a:rPr lang="en-US" smtClean="0"/>
-              <a:t>8/22/16</a:t>
+              <a:t>8/23/16</a:t>
             </a:fld>
             <a:endParaRPr lang="en-US"/>
           </a:p>
@@ -2263,7 +2263,7 @@
           <a:p>
             <a:fld id="{85FAFF62-CFE8-3749-A213-F8E507DE4B15}" type="datetimeFigureOut">
               <a:rPr lang="en-US" smtClean="0"/>
-              <a:t>8/22/16</a:t>
+              <a:t>8/23/16</a:t>
             </a:fld>
             <a:endParaRPr lang="en-US"/>
           </a:p>
@@ -2516,7 +2516,7 @@
           <a:p>
             <a:fld id="{85FAFF62-CFE8-3749-A213-F8E507DE4B15}" type="datetimeFigureOut">
               <a:rPr lang="en-US" smtClean="0"/>
-              <a:t>8/22/16</a:t>
+              <a:t>8/23/16</a:t>
             </a:fld>
             <a:endParaRPr lang="en-US"/>
           </a:p>
@@ -2729,7 +2729,7 @@
           <a:p>
             <a:fld id="{85FAFF62-CFE8-3749-A213-F8E507DE4B15}" type="datetimeFigureOut">
               <a:rPr lang="en-US" smtClean="0"/>
-              <a:t>8/22/16</a:t>
+              <a:t>8/23/16</a:t>
             </a:fld>
             <a:endParaRPr lang="en-US"/>
           </a:p>
@@ -3150,22 +3150,13 @@
           <a:p>
             <a:r>
               <a:rPr lang="en-US" dirty="0" smtClean="0"/>
-              <a:t>T | TH </a:t>
-            </a:r>
+              <a:t>T | TH 2 – 3:15</a:t>
+            </a:r>
+          </a:p>
+          <a:p>
             <a:r>
               <a:rPr lang="en-US" dirty="0" smtClean="0"/>
-              <a:t>2 – 3:15</a:t>
-            </a:r>
-            <a:endParaRPr lang="en-US" dirty="0" smtClean="0"/>
-          </a:p>
-          <a:p>
-            <a:r>
-              <a:rPr lang="en-US" dirty="0" smtClean="0"/>
-              <a:t>ANDN </a:t>
-            </a:r>
-            <a:r>
-              <a:rPr lang="en-US" dirty="0" smtClean="0"/>
-              <a:t>309</a:t>
+              <a:t>ANDN 309</a:t>
             </a:r>
             <a:endParaRPr lang="en-US" dirty="0"/>
           </a:p>
@@ -3273,6 +3264,13 @@
   <p:clrMapOvr>
     <a:masterClrMapping/>
   </p:clrMapOvr>
+  <p:timing>
+    <p:tnLst>
+      <p:par>
+        <p:cTn xmlns:p14="http://schemas.microsoft.com/office/powerpoint/2010/main" id="1" dur="indefinite" restart="never" nodeType="tmRoot"/>
+      </p:par>
+    </p:tnLst>
+  </p:timing>
 </p:sld>
 </file>
 
@@ -3581,11 +3579,7 @@
           <a:p>
             <a:r>
               <a:rPr lang="en-US" dirty="0" smtClean="0"/>
-              <a:t>Effort</a:t>
-            </a:r>
-            <a:r>
-              <a:rPr lang="en-US" dirty="0" smtClean="0"/>
-              <a:t>, ambition and creativity will get you an A in this class. Mailing it in will not go well for you.</a:t>
+              <a:t>Effort, ambition and creativity will get you an A in this class. Mailing it in will not go well for you.</a:t>
             </a:r>
             <a:endParaRPr lang="en-US" dirty="0"/>
           </a:p>
@@ -3870,6 +3864,13 @@
   <p:clrMapOvr>
     <a:masterClrMapping/>
   </p:clrMapOvr>
+  <p:timing>
+    <p:tnLst>
+      <p:par>
+        <p:cTn xmlns:p14="http://schemas.microsoft.com/office/powerpoint/2010/main" id="1" dur="indefinite" restart="never" nodeType="tmRoot"/>
+      </p:par>
+    </p:tnLst>
+  </p:timing>
 </p:sld>
 </file>
 
@@ -3926,7 +3927,7 @@
         <p:spPr/>
         <p:txBody>
           <a:bodyPr>
-            <a:normAutofit/>
+            <a:normAutofit fontScale="92500" lnSpcReduction="20000"/>
           </a:bodyPr>
           <a:lstStyle/>
           <a:p>
@@ -3960,7 +3961,15 @@
             </a:r>
             <a:r>
               <a:rPr lang="en-US" dirty="0" smtClean="0"/>
-              <a:t> installer for your machine (see the syllabus).</a:t>
+              <a:t> installer for your machine (see the </a:t>
+            </a:r>
+            <a:r>
+              <a:rPr lang="en-US" dirty="0" smtClean="0"/>
+              <a:t>course schedule)</a:t>
+            </a:r>
+            <a:r>
+              <a:rPr lang="en-US" dirty="0" smtClean="0"/>
+              <a:t>.</a:t>
             </a:r>
           </a:p>
           <a:p>
@@ -3978,7 +3987,17 @@
           <a:p>
             <a:r>
               <a:rPr lang="en-US" dirty="0" smtClean="0"/>
-              <a:t>Revel in all that you have done. Look upon it for it is good.</a:t>
+              <a:t>Revel in all that you have done. Look upon it for it is good</a:t>
+            </a:r>
+            <a:r>
+              <a:rPr lang="en-US" dirty="0" smtClean="0"/>
+              <a:t>.</a:t>
+            </a:r>
+          </a:p>
+          <a:p>
+            <a:r>
+              <a:rPr lang="en-US" dirty="0" smtClean="0"/>
+              <a:t>Watch the assigned videos. Be prepared for quiz/discussion.</a:t>
             </a:r>
             <a:endParaRPr lang="en-US" dirty="0"/>
           </a:p>

</xml_diff>